<commit_message>
all comments responded to
</commit_message>
<xml_diff>
--- a/editing_images/sidelobes.pptx
+++ b/editing_images/sidelobes.pptx
@@ -299,7 +299,7 @@
           <a:p>
             <a:fld id="{DA1758D5-137F-4DB5-9D29-8DD7A04F891C}" type="datetimeFigureOut">
               <a:rPr lang="en-US" smtClean="0"/>
-              <a:t>6/3/2018</a:t>
+              <a:t>7/15/2018</a:t>
             </a:fld>
             <a:endParaRPr lang="en-US"/>
           </a:p>
@@ -469,7 +469,7 @@
           <a:p>
             <a:fld id="{DA1758D5-137F-4DB5-9D29-8DD7A04F891C}" type="datetimeFigureOut">
               <a:rPr lang="en-US" smtClean="0"/>
-              <a:t>6/3/2018</a:t>
+              <a:t>7/15/2018</a:t>
             </a:fld>
             <a:endParaRPr lang="en-US"/>
           </a:p>
@@ -649,7 +649,7 @@
           <a:p>
             <a:fld id="{DA1758D5-137F-4DB5-9D29-8DD7A04F891C}" type="datetimeFigureOut">
               <a:rPr lang="en-US" smtClean="0"/>
-              <a:t>6/3/2018</a:t>
+              <a:t>7/15/2018</a:t>
             </a:fld>
             <a:endParaRPr lang="en-US"/>
           </a:p>
@@ -819,7 +819,7 @@
           <a:p>
             <a:fld id="{DA1758D5-137F-4DB5-9D29-8DD7A04F891C}" type="datetimeFigureOut">
               <a:rPr lang="en-US" smtClean="0"/>
-              <a:t>6/3/2018</a:t>
+              <a:t>7/15/2018</a:t>
             </a:fld>
             <a:endParaRPr lang="en-US"/>
           </a:p>
@@ -1065,7 +1065,7 @@
           <a:p>
             <a:fld id="{DA1758D5-137F-4DB5-9D29-8DD7A04F891C}" type="datetimeFigureOut">
               <a:rPr lang="en-US" smtClean="0"/>
-              <a:t>6/3/2018</a:t>
+              <a:t>7/15/2018</a:t>
             </a:fld>
             <a:endParaRPr lang="en-US"/>
           </a:p>
@@ -1353,7 +1353,7 @@
           <a:p>
             <a:fld id="{DA1758D5-137F-4DB5-9D29-8DD7A04F891C}" type="datetimeFigureOut">
               <a:rPr lang="en-US" smtClean="0"/>
-              <a:t>6/3/2018</a:t>
+              <a:t>7/15/2018</a:t>
             </a:fld>
             <a:endParaRPr lang="en-US"/>
           </a:p>
@@ -1775,7 +1775,7 @@
           <a:p>
             <a:fld id="{DA1758D5-137F-4DB5-9D29-8DD7A04F891C}" type="datetimeFigureOut">
               <a:rPr lang="en-US" smtClean="0"/>
-              <a:t>6/3/2018</a:t>
+              <a:t>7/15/2018</a:t>
             </a:fld>
             <a:endParaRPr lang="en-US"/>
           </a:p>
@@ -1893,7 +1893,7 @@
           <a:p>
             <a:fld id="{DA1758D5-137F-4DB5-9D29-8DD7A04F891C}" type="datetimeFigureOut">
               <a:rPr lang="en-US" smtClean="0"/>
-              <a:t>6/3/2018</a:t>
+              <a:t>7/15/2018</a:t>
             </a:fld>
             <a:endParaRPr lang="en-US"/>
           </a:p>
@@ -1988,7 +1988,7 @@
           <a:p>
             <a:fld id="{DA1758D5-137F-4DB5-9D29-8DD7A04F891C}" type="datetimeFigureOut">
               <a:rPr lang="en-US" smtClean="0"/>
-              <a:t>6/3/2018</a:t>
+              <a:t>7/15/2018</a:t>
             </a:fld>
             <a:endParaRPr lang="en-US"/>
           </a:p>
@@ -2265,7 +2265,7 @@
           <a:p>
             <a:fld id="{DA1758D5-137F-4DB5-9D29-8DD7A04F891C}" type="datetimeFigureOut">
               <a:rPr lang="en-US" smtClean="0"/>
-              <a:t>6/3/2018</a:t>
+              <a:t>7/15/2018</a:t>
             </a:fld>
             <a:endParaRPr lang="en-US"/>
           </a:p>
@@ -2518,7 +2518,7 @@
           <a:p>
             <a:fld id="{DA1758D5-137F-4DB5-9D29-8DD7A04F891C}" type="datetimeFigureOut">
               <a:rPr lang="en-US" smtClean="0"/>
-              <a:t>6/3/2018</a:t>
+              <a:t>7/15/2018</a:t>
             </a:fld>
             <a:endParaRPr lang="en-US"/>
           </a:p>
@@ -2731,7 +2731,7 @@
           <a:p>
             <a:fld id="{DA1758D5-137F-4DB5-9D29-8DD7A04F891C}" type="datetimeFigureOut">
               <a:rPr lang="en-US" smtClean="0"/>
-              <a:t>6/3/2018</a:t>
+              <a:t>7/15/2018</a:t>
             </a:fld>
             <a:endParaRPr lang="en-US"/>
           </a:p>
@@ -3108,288 +3108,634 @@
       </p:grpSpPr>
       <p:grpSp>
         <p:nvGrpSpPr>
-          <p:cNvPr id="18" name="Group 17"/>
+          <p:cNvPr id="15" name="Group 14"/>
           <p:cNvGrpSpPr/>
           <p:nvPr/>
         </p:nvGrpSpPr>
         <p:grpSpPr>
           <a:xfrm>
-            <a:off x="746800" y="544350"/>
-            <a:ext cx="7229282" cy="3583460"/>
-            <a:chOff x="746800" y="544350"/>
-            <a:chExt cx="7229282" cy="3583460"/>
+            <a:off x="746800" y="239550"/>
+            <a:ext cx="8397200" cy="3890994"/>
+            <a:chOff x="746800" y="239550"/>
+            <a:chExt cx="8397200" cy="3890994"/>
           </a:xfrm>
         </p:grpSpPr>
-        <p:pic>
-          <p:nvPicPr>
-            <p:cNvPr id="2" name="Shape 216"/>
-            <p:cNvPicPr preferRelativeResize="0"/>
+        <p:grpSp>
+          <p:nvGrpSpPr>
+            <p:cNvPr id="18" name="Group 17"/>
+            <p:cNvGrpSpPr/>
             <p:nvPr/>
-          </p:nvPicPr>
-          <p:blipFill>
-            <a:blip r:embed="rId2">
-              <a:alphaModFix/>
-            </a:blip>
-            <a:stretch>
-              <a:fillRect/>
-            </a:stretch>
-          </p:blipFill>
-          <p:spPr>
-            <a:xfrm rot="12622774" flipH="1">
-              <a:off x="4430302" y="1098947"/>
-              <a:ext cx="3545780" cy="2813103"/>
+          </p:nvGrpSpPr>
+          <p:grpSpPr>
+            <a:xfrm>
+              <a:off x="746800" y="544350"/>
+              <a:ext cx="7229282" cy="3583460"/>
+              <a:chOff x="746800" y="544350"/>
+              <a:chExt cx="7229282" cy="3583460"/>
             </a:xfrm>
-            <a:prstGeom prst="rect">
-              <a:avLst/>
-            </a:prstGeom>
-            <a:noFill/>
-            <a:ln>
+          </p:grpSpPr>
+          <p:pic>
+            <p:nvPicPr>
+              <p:cNvPr id="2" name="Shape 216"/>
+              <p:cNvPicPr preferRelativeResize="0"/>
+              <p:nvPr/>
+            </p:nvPicPr>
+            <p:blipFill>
+              <a:blip r:embed="rId2">
+                <a:alphaModFix/>
+              </a:blip>
+              <a:stretch>
+                <a:fillRect/>
+              </a:stretch>
+            </p:blipFill>
+            <p:spPr>
+              <a:xfrm rot="12622774" flipH="1">
+                <a:off x="4430302" y="1098947"/>
+                <a:ext cx="3545780" cy="2813103"/>
+              </a:xfrm>
+              <a:prstGeom prst="rect">
+                <a:avLst/>
+              </a:prstGeom>
               <a:noFill/>
-            </a:ln>
-          </p:spPr>
-        </p:pic>
-        <p:cxnSp>
-          <p:nvCxnSpPr>
-            <p:cNvPr id="3" name="Shape 220"/>
-            <p:cNvCxnSpPr/>
-            <p:nvPr/>
-          </p:nvCxnSpPr>
-          <p:spPr>
-            <a:xfrm rot="12600000">
-              <a:off x="5992557" y="2955822"/>
-              <a:ext cx="0" cy="685800"/>
-            </a:xfrm>
-            <a:prstGeom prst="straightConnector1">
-              <a:avLst/>
-            </a:prstGeom>
-            <a:noFill/>
-            <a:ln w="38100" cap="flat" cmpd="sng">
+              <a:ln>
+                <a:noFill/>
+              </a:ln>
+            </p:spPr>
+          </p:pic>
+          <p:cxnSp>
+            <p:nvCxnSpPr>
+              <p:cNvPr id="3" name="Shape 220"/>
+              <p:cNvCxnSpPr/>
+              <p:nvPr/>
+            </p:nvCxnSpPr>
+            <p:spPr>
+              <a:xfrm rot="12600000">
+                <a:off x="6000750" y="2955822"/>
+                <a:ext cx="0" cy="685800"/>
+              </a:xfrm>
+              <a:prstGeom prst="straightConnector1">
+                <a:avLst/>
+              </a:prstGeom>
+              <a:noFill/>
+              <a:ln w="38100" cap="flat" cmpd="sng">
+                <a:solidFill>
+                  <a:schemeClr val="dk1"/>
+                </a:solidFill>
+                <a:prstDash val="solid"/>
+                <a:round/>
+                <a:headEnd type="none" w="med" len="med"/>
+                <a:tailEnd type="none" w="med" len="med"/>
+              </a:ln>
+              <a:effectLst>
+                <a:outerShdw blurRad="40000" dist="23000" dir="5400000" rotWithShape="0">
+                  <a:srgbClr val="000000">
+                    <a:alpha val="34900"/>
+                  </a:srgbClr>
+                </a:outerShdw>
+              </a:effectLst>
+            </p:spPr>
+          </p:cxnSp>
+          <p:sp>
+            <p:nvSpPr>
+              <p:cNvPr id="4" name="Shape 221"/>
+              <p:cNvSpPr txBox="1"/>
+              <p:nvPr/>
+            </p:nvSpPr>
+            <p:spPr>
+              <a:xfrm>
+                <a:off x="5247988" y="2938281"/>
+                <a:ext cx="752189" cy="324942"/>
+              </a:xfrm>
+              <a:prstGeom prst="rect">
+                <a:avLst/>
+              </a:prstGeom>
+              <a:noFill/>
+              <a:ln>
+                <a:noFill/>
+              </a:ln>
+            </p:spPr>
+            <p:txBody>
+              <a:bodyPr wrap="square" lIns="91425" tIns="45700" rIns="91425" bIns="45700" anchor="t" anchorCtr="0">
+                <a:noAutofit/>
+              </a:bodyPr>
+              <a:lstStyle/>
+              <a:p>
+                <a:pPr marL="0" marR="0" lvl="0" indent="0" algn="l" rtl="0">
+                  <a:spcBef>
+                    <a:spcPts val="0"/>
+                  </a:spcBef>
+                  <a:buNone/>
+                </a:pPr>
+                <a:r>
+                  <a:rPr lang="en" sz="1400" dirty="0">
+                    <a:solidFill>
+                      <a:schemeClr val="dk1"/>
+                    </a:solidFill>
+                    <a:latin typeface="Calibri"/>
+                    <a:ea typeface="Calibri"/>
+                    <a:cs typeface="Calibri"/>
+                    <a:sym typeface="Calibri"/>
+                  </a:rPr>
+                  <a:t>Focal plane</a:t>
+                </a:r>
+              </a:p>
+            </p:txBody>
+          </p:sp>
+          <p:pic>
+            <p:nvPicPr>
+              <p:cNvPr id="5" name="Shape 222" descr="Y:\Downloads\140cm_crossed_drag_straylight.png"/>
+              <p:cNvPicPr preferRelativeResize="0"/>
+              <p:nvPr/>
+            </p:nvPicPr>
+            <p:blipFill rotWithShape="1">
+              <a:blip r:embed="rId3">
+                <a:alphaModFix/>
+              </a:blip>
+              <a:srcRect l="27713" t="6058" r="15808" b="13048"/>
+              <a:stretch/>
+            </p:blipFill>
+            <p:spPr>
+              <a:xfrm rot="5400000">
+                <a:off x="1605900" y="1009311"/>
+                <a:ext cx="3461059" cy="2775940"/>
+              </a:xfrm>
+              <a:prstGeom prst="rect">
+                <a:avLst/>
+              </a:prstGeom>
+              <a:noFill/>
+              <a:ln>
+                <a:noFill/>
+              </a:ln>
+            </p:spPr>
+          </p:pic>
+          <p:sp>
+            <p:nvSpPr>
+              <p:cNvPr id="32" name="Rectangle 31"/>
+              <p:cNvSpPr/>
+              <p:nvPr/>
+            </p:nvSpPr>
+            <p:spPr>
+              <a:xfrm>
+                <a:off x="2016879" y="2836682"/>
+                <a:ext cx="129184" cy="203199"/>
+              </a:xfrm>
+              <a:prstGeom prst="rect">
+                <a:avLst/>
+              </a:prstGeom>
               <a:solidFill>
-                <a:schemeClr val="dk1"/>
+                <a:schemeClr val="bg1"/>
               </a:solidFill>
-              <a:prstDash val="solid"/>
-              <a:round/>
-              <a:headEnd type="none" w="med" len="med"/>
-              <a:tailEnd type="none" w="med" len="med"/>
-            </a:ln>
-            <a:effectLst>
-              <a:outerShdw blurRad="40000" dist="23000" dir="5400000" rotWithShape="0">
-                <a:srgbClr val="000000">
-                  <a:alpha val="34900"/>
-                </a:srgbClr>
-              </a:outerShdw>
-            </a:effectLst>
-          </p:spPr>
-        </p:cxnSp>
+              <a:ln>
+                <a:solidFill>
+                  <a:schemeClr val="bg1"/>
+                </a:solidFill>
+              </a:ln>
+            </p:spPr>
+            <p:style>
+              <a:lnRef idx="2">
+                <a:schemeClr val="accent1">
+                  <a:shade val="50000"/>
+                </a:schemeClr>
+              </a:lnRef>
+              <a:fillRef idx="1">
+                <a:schemeClr val="accent1"/>
+              </a:fillRef>
+              <a:effectRef idx="0">
+                <a:schemeClr val="accent1"/>
+              </a:effectRef>
+              <a:fontRef idx="minor">
+                <a:schemeClr val="lt1"/>
+              </a:fontRef>
+            </p:style>
+            <p:txBody>
+              <a:bodyPr rtlCol="0" anchor="ctr"/>
+              <a:lstStyle/>
+              <a:p>
+                <a:pPr algn="ctr"/>
+                <a:endParaRPr lang="en-US"/>
+              </a:p>
+            </p:txBody>
+          </p:sp>
+          <p:cxnSp>
+            <p:nvCxnSpPr>
+              <p:cNvPr id="6" name="Shape 223"/>
+              <p:cNvCxnSpPr/>
+              <p:nvPr/>
+            </p:nvCxnSpPr>
+            <p:spPr>
+              <a:xfrm rot="5400000">
+                <a:off x="3528975" y="745351"/>
+                <a:ext cx="0" cy="604800"/>
+              </a:xfrm>
+              <a:prstGeom prst="straightConnector1">
+                <a:avLst/>
+              </a:prstGeom>
+              <a:noFill/>
+              <a:ln w="38100" cap="flat" cmpd="sng">
+                <a:solidFill>
+                  <a:schemeClr val="dk1"/>
+                </a:solidFill>
+                <a:prstDash val="solid"/>
+                <a:round/>
+                <a:headEnd type="none" w="med" len="med"/>
+                <a:tailEnd type="none" w="med" len="med"/>
+              </a:ln>
+              <a:effectLst>
+                <a:outerShdw blurRad="40000" dist="23000" dir="5400000" rotWithShape="0">
+                  <a:srgbClr val="000000">
+                    <a:alpha val="34900"/>
+                  </a:srgbClr>
+                </a:outerShdw>
+              </a:effectLst>
+            </p:spPr>
+          </p:cxnSp>
+          <p:sp>
+            <p:nvSpPr>
+              <p:cNvPr id="7" name="Shape 224"/>
+              <p:cNvSpPr txBox="1"/>
+              <p:nvPr/>
+            </p:nvSpPr>
+            <p:spPr>
+              <a:xfrm>
+                <a:off x="3010252" y="750570"/>
+                <a:ext cx="1146892" cy="213600"/>
+              </a:xfrm>
+              <a:prstGeom prst="rect">
+                <a:avLst/>
+              </a:prstGeom>
+              <a:noFill/>
+              <a:ln>
+                <a:noFill/>
+              </a:ln>
+            </p:spPr>
+            <p:txBody>
+              <a:bodyPr wrap="square" lIns="91425" tIns="45700" rIns="91425" bIns="45700" anchor="t" anchorCtr="0">
+                <a:noAutofit/>
+              </a:bodyPr>
+              <a:lstStyle/>
+              <a:p>
+                <a:pPr marL="0" marR="0" lvl="0" indent="0" algn="l" rtl="0">
+                  <a:spcBef>
+                    <a:spcPts val="0"/>
+                  </a:spcBef>
+                  <a:buNone/>
+                </a:pPr>
+                <a:r>
+                  <a:rPr lang="en" sz="1400" dirty="0">
+                    <a:solidFill>
+                      <a:schemeClr val="dk1"/>
+                    </a:solidFill>
+                    <a:latin typeface="Calibri"/>
+                    <a:ea typeface="Calibri"/>
+                    <a:cs typeface="Calibri"/>
+                    <a:sym typeface="Calibri"/>
+                  </a:rPr>
+                  <a:t>Focal plane</a:t>
+                </a:r>
+              </a:p>
+            </p:txBody>
+          </p:sp>
+          <p:sp>
+            <p:nvSpPr>
+              <p:cNvPr id="8" name="Shape 225"/>
+              <p:cNvSpPr txBox="1"/>
+              <p:nvPr/>
+            </p:nvSpPr>
+            <p:spPr>
+              <a:xfrm>
+                <a:off x="746800" y="544350"/>
+                <a:ext cx="1691600" cy="427200"/>
+              </a:xfrm>
+              <a:prstGeom prst="rect">
+                <a:avLst/>
+              </a:prstGeom>
+              <a:noFill/>
+              <a:ln>
+                <a:noFill/>
+              </a:ln>
+            </p:spPr>
+            <p:txBody>
+              <a:bodyPr wrap="square" lIns="91425" tIns="45700" rIns="91425" bIns="45700" anchor="t" anchorCtr="0">
+                <a:noAutofit/>
+              </a:bodyPr>
+              <a:lstStyle/>
+              <a:p>
+                <a:pPr marL="0" marR="0" lvl="0" indent="0" algn="ctr" rtl="0">
+                  <a:spcBef>
+                    <a:spcPts val="0"/>
+                  </a:spcBef>
+                  <a:buNone/>
+                </a:pPr>
+                <a:r>
+                  <a:rPr lang="en" sz="1800" dirty="0" smtClean="0">
+                    <a:solidFill>
+                      <a:srgbClr val="00B050"/>
+                    </a:solidFill>
+                    <a:latin typeface="Calibri"/>
+                    <a:ea typeface="Calibri"/>
+                    <a:cs typeface="Calibri"/>
+                    <a:sym typeface="Calibri"/>
+                  </a:rPr>
+                  <a:t>Sidelobe</a:t>
+                </a:r>
+                <a:endParaRPr lang="en" sz="1800" dirty="0">
+                  <a:solidFill>
+                    <a:srgbClr val="00B050"/>
+                  </a:solidFill>
+                  <a:latin typeface="Calibri"/>
+                  <a:ea typeface="Calibri"/>
+                  <a:cs typeface="Calibri"/>
+                  <a:sym typeface="Calibri"/>
+                </a:endParaRPr>
+              </a:p>
+            </p:txBody>
+          </p:sp>
+          <p:cxnSp>
+            <p:nvCxnSpPr>
+              <p:cNvPr id="9" name="Shape 226"/>
+              <p:cNvCxnSpPr/>
+              <p:nvPr/>
+            </p:nvCxnSpPr>
+            <p:spPr>
+              <a:xfrm flipH="1" flipV="1">
+                <a:off x="1714500" y="904875"/>
+                <a:ext cx="981076" cy="1781176"/>
+              </a:xfrm>
+              <a:prstGeom prst="straightConnector1">
+                <a:avLst/>
+              </a:prstGeom>
+              <a:noFill/>
+              <a:ln w="25400" cap="flat" cmpd="sng">
+                <a:solidFill>
+                  <a:srgbClr val="00B050"/>
+                </a:solidFill>
+                <a:prstDash val="solid"/>
+                <a:round/>
+                <a:headEnd type="none" w="med" len="med"/>
+                <a:tailEnd type="stealth" w="lg" len="lg"/>
+              </a:ln>
+              <a:effectLst>
+                <a:outerShdw blurRad="40000" dist="20000" dir="5400000" rotWithShape="0">
+                  <a:srgbClr val="000000">
+                    <a:alpha val="37650"/>
+                  </a:srgbClr>
+                </a:outerShdw>
+              </a:effectLst>
+            </p:spPr>
+          </p:cxnSp>
+          <p:cxnSp>
+            <p:nvCxnSpPr>
+              <p:cNvPr id="10" name="Shape 227"/>
+              <p:cNvCxnSpPr/>
+              <p:nvPr/>
+            </p:nvCxnSpPr>
+            <p:spPr>
+              <a:xfrm flipH="1">
+                <a:off x="3273426" y="2898775"/>
+                <a:ext cx="1168399" cy="3175"/>
+              </a:xfrm>
+              <a:prstGeom prst="straightConnector1">
+                <a:avLst/>
+              </a:prstGeom>
+              <a:noFill/>
+              <a:ln w="25400" cap="flat" cmpd="sng">
+                <a:solidFill>
+                  <a:srgbClr val="00B050"/>
+                </a:solidFill>
+                <a:prstDash val="solid"/>
+                <a:round/>
+                <a:headEnd type="none" w="med" len="med"/>
+                <a:tailEnd type="stealth" w="lg" len="lg"/>
+              </a:ln>
+              <a:effectLst>
+                <a:outerShdw blurRad="40000" dist="20000" dir="5400000" rotWithShape="0">
+                  <a:srgbClr val="000000">
+                    <a:alpha val="37650"/>
+                  </a:srgbClr>
+                </a:outerShdw>
+              </a:effectLst>
+            </p:spPr>
+          </p:cxnSp>
+          <p:cxnSp>
+            <p:nvCxnSpPr>
+              <p:cNvPr id="11" name="Shape 228"/>
+              <p:cNvCxnSpPr/>
+              <p:nvPr/>
+            </p:nvCxnSpPr>
+            <p:spPr>
+              <a:xfrm flipV="1">
+                <a:off x="4140200" y="2978150"/>
+                <a:ext cx="422275" cy="487778"/>
+              </a:xfrm>
+              <a:prstGeom prst="straightConnector1">
+                <a:avLst/>
+              </a:prstGeom>
+              <a:noFill/>
+              <a:ln w="25400" cap="flat" cmpd="sng">
+                <a:solidFill>
+                  <a:srgbClr val="00B050"/>
+                </a:solidFill>
+                <a:prstDash val="solid"/>
+                <a:round/>
+                <a:headEnd type="none" w="med" len="med"/>
+                <a:tailEnd type="stealth" w="lg" len="lg"/>
+              </a:ln>
+              <a:effectLst>
+                <a:outerShdw blurRad="40000" dist="20000" dir="5400000" rotWithShape="0">
+                  <a:srgbClr val="000000">
+                    <a:alpha val="37650"/>
+                  </a:srgbClr>
+                </a:outerShdw>
+              </a:effectLst>
+            </p:spPr>
+          </p:cxnSp>
+          <p:cxnSp>
+            <p:nvCxnSpPr>
+              <p:cNvPr id="12" name="Shape 229"/>
+              <p:cNvCxnSpPr/>
+              <p:nvPr/>
+            </p:nvCxnSpPr>
+            <p:spPr>
+              <a:xfrm>
+                <a:off x="3657600" y="1552575"/>
+                <a:ext cx="393700" cy="1758950"/>
+              </a:xfrm>
+              <a:prstGeom prst="straightConnector1">
+                <a:avLst/>
+              </a:prstGeom>
+              <a:noFill/>
+              <a:ln w="25400" cap="flat" cmpd="sng">
+                <a:solidFill>
+                  <a:srgbClr val="00B050"/>
+                </a:solidFill>
+                <a:prstDash val="solid"/>
+                <a:round/>
+                <a:headEnd type="none" w="med" len="med"/>
+                <a:tailEnd type="stealth" w="lg" len="lg"/>
+              </a:ln>
+              <a:effectLst>
+                <a:outerShdw blurRad="40000" dist="20000" dir="5400000" rotWithShape="0">
+                  <a:srgbClr val="000000">
+                    <a:alpha val="37650"/>
+                  </a:srgbClr>
+                </a:outerShdw>
+              </a:effectLst>
+            </p:spPr>
+          </p:cxnSp>
+          <p:sp>
+            <p:nvSpPr>
+              <p:cNvPr id="13" name="Shape 230"/>
+              <p:cNvSpPr txBox="1"/>
+              <p:nvPr/>
+            </p:nvSpPr>
+            <p:spPr>
+              <a:xfrm>
+                <a:off x="1068000" y="2830350"/>
+                <a:ext cx="1294200" cy="427200"/>
+              </a:xfrm>
+              <a:prstGeom prst="rect">
+                <a:avLst/>
+              </a:prstGeom>
+              <a:noFill/>
+              <a:ln>
+                <a:noFill/>
+              </a:ln>
+            </p:spPr>
+            <p:txBody>
+              <a:bodyPr wrap="square" lIns="91425" tIns="45700" rIns="91425" bIns="45700" anchor="t" anchorCtr="0">
+                <a:noAutofit/>
+              </a:bodyPr>
+              <a:lstStyle/>
+              <a:p>
+                <a:pPr marL="0" marR="0" lvl="0" indent="0" algn="l" rtl="0">
+                  <a:spcBef>
+                    <a:spcPts val="0"/>
+                  </a:spcBef>
+                  <a:buNone/>
+                </a:pPr>
+                <a:r>
+                  <a:rPr lang="en" sz="1800" dirty="0">
+                    <a:solidFill>
+                      <a:srgbClr val="538CD5"/>
+                    </a:solidFill>
+                    <a:latin typeface="Calibri"/>
+                    <a:ea typeface="Calibri"/>
+                    <a:cs typeface="Calibri"/>
+                    <a:sym typeface="Calibri"/>
+                  </a:rPr>
+                  <a:t>Direct view </a:t>
+                </a:r>
+                <a:r>
+                  <a:rPr lang="en" sz="1800" dirty="0" smtClean="0">
+                    <a:solidFill>
+                      <a:srgbClr val="538CD5"/>
+                    </a:solidFill>
+                    <a:latin typeface="Calibri"/>
+                    <a:ea typeface="Calibri"/>
+                    <a:cs typeface="Calibri"/>
+                    <a:sym typeface="Calibri"/>
+                  </a:rPr>
+                  <a:t>to </a:t>
+                </a:r>
+                <a:r>
+                  <a:rPr lang="en" sz="1800" dirty="0">
+                    <a:solidFill>
+                      <a:srgbClr val="538CD5"/>
+                    </a:solidFill>
+                    <a:latin typeface="Calibri"/>
+                    <a:ea typeface="Calibri"/>
+                    <a:cs typeface="Calibri"/>
+                    <a:sym typeface="Calibri"/>
+                  </a:rPr>
+                  <a:t>sky</a:t>
+                </a:r>
+              </a:p>
+            </p:txBody>
+          </p:sp>
+          <p:cxnSp>
+            <p:nvCxnSpPr>
+              <p:cNvPr id="14" name="Shape 231"/>
+              <p:cNvCxnSpPr/>
+              <p:nvPr/>
+            </p:nvCxnSpPr>
+            <p:spPr>
+              <a:xfrm rot="5400000">
+                <a:off x="1859475" y="1219758"/>
+                <a:ext cx="1814700" cy="1524300"/>
+              </a:xfrm>
+              <a:prstGeom prst="straightConnector1">
+                <a:avLst/>
+              </a:prstGeom>
+              <a:noFill/>
+              <a:ln w="9525" cap="flat" cmpd="sng">
+                <a:solidFill>
+                  <a:srgbClr val="4A7DBA"/>
+                </a:solidFill>
+                <a:prstDash val="solid"/>
+                <a:round/>
+                <a:headEnd type="none" w="med" len="med"/>
+                <a:tailEnd type="stealth" w="lg" len="lg"/>
+              </a:ln>
+            </p:spPr>
+          </p:cxnSp>
+          <p:sp>
+            <p:nvSpPr>
+              <p:cNvPr id="17" name="Rectangle 16"/>
+              <p:cNvSpPr/>
+              <p:nvPr/>
+            </p:nvSpPr>
+            <p:spPr>
+              <a:xfrm>
+                <a:off x="2073851" y="1383030"/>
+                <a:ext cx="123567" cy="76200"/>
+              </a:xfrm>
+              <a:prstGeom prst="rect">
+                <a:avLst/>
+              </a:prstGeom>
+              <a:solidFill>
+                <a:schemeClr val="bg1"/>
+              </a:solidFill>
+              <a:ln>
+                <a:solidFill>
+                  <a:schemeClr val="bg1"/>
+                </a:solidFill>
+              </a:ln>
+            </p:spPr>
+            <p:style>
+              <a:lnRef idx="2">
+                <a:schemeClr val="accent1">
+                  <a:shade val="50000"/>
+                </a:schemeClr>
+              </a:lnRef>
+              <a:fillRef idx="1">
+                <a:schemeClr val="accent1"/>
+              </a:fillRef>
+              <a:effectRef idx="0">
+                <a:schemeClr val="accent1"/>
+              </a:effectRef>
+              <a:fontRef idx="minor">
+                <a:schemeClr val="lt1"/>
+              </a:fontRef>
+            </p:style>
+            <p:txBody>
+              <a:bodyPr rtlCol="0" anchor="ctr"/>
+              <a:lstStyle/>
+              <a:p>
+                <a:pPr algn="ctr"/>
+                <a:endParaRPr lang="en-US"/>
+              </a:p>
+            </p:txBody>
+          </p:sp>
+        </p:grpSp>
         <p:sp>
           <p:nvSpPr>
-            <p:cNvPr id="4" name="Shape 221"/>
+            <p:cNvPr id="19" name="Shape 225"/>
             <p:cNvSpPr txBox="1"/>
             <p:nvPr/>
           </p:nvSpPr>
           <p:spPr>
             <a:xfrm>
-              <a:off x="5247988" y="2938281"/>
-              <a:ext cx="752189" cy="324942"/>
-            </a:xfrm>
-            <a:prstGeom prst="rect">
-              <a:avLst/>
-            </a:prstGeom>
-            <a:noFill/>
-            <a:ln>
-              <a:noFill/>
-            </a:ln>
-          </p:spPr>
-          <p:txBody>
-            <a:bodyPr wrap="square" lIns="91425" tIns="45700" rIns="91425" bIns="45700" anchor="t" anchorCtr="0">
-              <a:noAutofit/>
-            </a:bodyPr>
-            <a:lstStyle/>
-            <a:p>
-              <a:pPr marL="0" marR="0" lvl="0" indent="0" algn="l" rtl="0">
-                <a:spcBef>
-                  <a:spcPts val="0"/>
-                </a:spcBef>
-                <a:buNone/>
-              </a:pPr>
-              <a:r>
-                <a:rPr lang="en" sz="1400" dirty="0">
-                  <a:solidFill>
-                    <a:schemeClr val="dk1"/>
-                  </a:solidFill>
-                  <a:latin typeface="Calibri"/>
-                  <a:ea typeface="Calibri"/>
-                  <a:cs typeface="Calibri"/>
-                  <a:sym typeface="Calibri"/>
-                </a:rPr>
-                <a:t>Focal plane</a:t>
-              </a:r>
-            </a:p>
-          </p:txBody>
-        </p:sp>
-        <p:pic>
-          <p:nvPicPr>
-            <p:cNvPr id="5" name="Shape 222" descr="Y:\Downloads\140cm_crossed_drag_straylight.png"/>
-            <p:cNvPicPr preferRelativeResize="0"/>
-            <p:nvPr/>
-          </p:nvPicPr>
-          <p:blipFill rotWithShape="1">
-            <a:blip r:embed="rId3">
-              <a:alphaModFix/>
-            </a:blip>
-            <a:srcRect l="27713" t="6058" r="15808" b="13048"/>
-            <a:stretch/>
-          </p:blipFill>
-          <p:spPr>
-            <a:xfrm rot="5400000">
-              <a:off x="1605900" y="1009311"/>
-              <a:ext cx="3461059" cy="2775940"/>
-            </a:xfrm>
-            <a:prstGeom prst="rect">
-              <a:avLst/>
-            </a:prstGeom>
-            <a:noFill/>
-            <a:ln>
-              <a:noFill/>
-            </a:ln>
-          </p:spPr>
-        </p:pic>
-        <p:sp>
-          <p:nvSpPr>
-            <p:cNvPr id="32" name="Rectangle 31"/>
-            <p:cNvSpPr/>
-            <p:nvPr/>
-          </p:nvSpPr>
-          <p:spPr>
-            <a:xfrm>
-              <a:off x="2016879" y="2836682"/>
-              <a:ext cx="129184" cy="203199"/>
-            </a:xfrm>
-            <a:prstGeom prst="rect">
-              <a:avLst/>
-            </a:prstGeom>
-            <a:solidFill>
-              <a:schemeClr val="bg1"/>
-            </a:solidFill>
-            <a:ln>
-              <a:solidFill>
-                <a:schemeClr val="bg1"/>
-              </a:solidFill>
-            </a:ln>
-          </p:spPr>
-          <p:style>
-            <a:lnRef idx="2">
-              <a:schemeClr val="accent1">
-                <a:shade val="50000"/>
-              </a:schemeClr>
-            </a:lnRef>
-            <a:fillRef idx="1">
-              <a:schemeClr val="accent1"/>
-            </a:fillRef>
-            <a:effectRef idx="0">
-              <a:schemeClr val="accent1"/>
-            </a:effectRef>
-            <a:fontRef idx="minor">
-              <a:schemeClr val="lt1"/>
-            </a:fontRef>
-          </p:style>
-          <p:txBody>
-            <a:bodyPr rtlCol="0" anchor="ctr"/>
-            <a:lstStyle/>
-            <a:p>
-              <a:pPr algn="ctr"/>
-              <a:endParaRPr lang="en-US"/>
-            </a:p>
-          </p:txBody>
-        </p:sp>
-        <p:cxnSp>
-          <p:nvCxnSpPr>
-            <p:cNvPr id="6" name="Shape 223"/>
-            <p:cNvCxnSpPr/>
-            <p:nvPr/>
-          </p:nvCxnSpPr>
-          <p:spPr>
-            <a:xfrm rot="5400000">
-              <a:off x="3528975" y="745351"/>
-              <a:ext cx="0" cy="604800"/>
-            </a:xfrm>
-            <a:prstGeom prst="straightConnector1">
-              <a:avLst/>
-            </a:prstGeom>
-            <a:noFill/>
-            <a:ln w="38100" cap="flat" cmpd="sng">
-              <a:solidFill>
-                <a:schemeClr val="dk1"/>
-              </a:solidFill>
-              <a:prstDash val="solid"/>
-              <a:round/>
-              <a:headEnd type="none" w="med" len="med"/>
-              <a:tailEnd type="none" w="med" len="med"/>
-            </a:ln>
-            <a:effectLst>
-              <a:outerShdw blurRad="40000" dist="23000" dir="5400000" rotWithShape="0">
-                <a:srgbClr val="000000">
-                  <a:alpha val="34900"/>
-                </a:srgbClr>
-              </a:outerShdw>
-            </a:effectLst>
-          </p:spPr>
-        </p:cxnSp>
-        <p:sp>
-          <p:nvSpPr>
-            <p:cNvPr id="7" name="Shape 224"/>
-            <p:cNvSpPr txBox="1"/>
-            <p:nvPr/>
-          </p:nvSpPr>
-          <p:spPr>
-            <a:xfrm>
-              <a:off x="3010252" y="750570"/>
-              <a:ext cx="1146892" cy="213600"/>
-            </a:xfrm>
-            <a:prstGeom prst="rect">
-              <a:avLst/>
-            </a:prstGeom>
-            <a:noFill/>
-            <a:ln>
-              <a:noFill/>
-            </a:ln>
-          </p:spPr>
-          <p:txBody>
-            <a:bodyPr wrap="square" lIns="91425" tIns="45700" rIns="91425" bIns="45700" anchor="t" anchorCtr="0">
-              <a:noAutofit/>
-            </a:bodyPr>
-            <a:lstStyle/>
-            <a:p>
-              <a:pPr marL="0" marR="0" lvl="0" indent="0" algn="l" rtl="0">
-                <a:spcBef>
-                  <a:spcPts val="0"/>
-                </a:spcBef>
-                <a:buNone/>
-              </a:pPr>
-              <a:r>
-                <a:rPr lang="en" sz="1400" dirty="0">
-                  <a:solidFill>
-                    <a:schemeClr val="dk1"/>
-                  </a:solidFill>
-                  <a:latin typeface="Calibri"/>
-                  <a:ea typeface="Calibri"/>
-                  <a:cs typeface="Calibri"/>
-                  <a:sym typeface="Calibri"/>
-                </a:rPr>
-                <a:t>Focal plane</a:t>
-              </a:r>
-            </a:p>
-          </p:txBody>
-        </p:sp>
-        <p:sp>
-          <p:nvSpPr>
-            <p:cNvPr id="8" name="Shape 225"/>
-            <p:cNvSpPr txBox="1"/>
-            <p:nvPr/>
-          </p:nvSpPr>
-          <p:spPr>
-            <a:xfrm>
-              <a:off x="746800" y="544350"/>
+              <a:off x="2347000" y="239550"/>
               <a:ext cx="1691600" cy="427200"/>
             </a:xfrm>
             <a:prstGeom prst="rect">
@@ -3414,20 +3760,63 @@
               </a:pPr>
               <a:r>
                 <a:rPr lang="en" sz="1800" dirty="0" smtClean="0">
-                  <a:solidFill>
-                    <a:srgbClr val="00B050"/>
-                  </a:solidFill>
                   <a:latin typeface="Calibri"/>
                   <a:ea typeface="Calibri"/>
                   <a:cs typeface="Calibri"/>
                   <a:sym typeface="Calibri"/>
                 </a:rPr>
-                <a:t>Sidelobe</a:t>
+                <a:t>Cross-Dragone</a:t>
               </a:r>
               <a:endParaRPr lang="en" sz="1800" dirty="0">
-                <a:solidFill>
-                  <a:srgbClr val="00B050"/>
-                </a:solidFill>
+                <a:latin typeface="Calibri"/>
+                <a:ea typeface="Calibri"/>
+                <a:cs typeface="Calibri"/>
+                <a:sym typeface="Calibri"/>
+              </a:endParaRPr>
+            </a:p>
+          </p:txBody>
+        </p:sp>
+        <p:sp>
+          <p:nvSpPr>
+            <p:cNvPr id="20" name="Shape 225"/>
+            <p:cNvSpPr txBox="1"/>
+            <p:nvPr/>
+          </p:nvSpPr>
+          <p:spPr>
+            <a:xfrm>
+              <a:off x="5699800" y="239550"/>
+              <a:ext cx="1691600" cy="427200"/>
+            </a:xfrm>
+            <a:prstGeom prst="rect">
+              <a:avLst/>
+            </a:prstGeom>
+            <a:noFill/>
+            <a:ln>
+              <a:noFill/>
+            </a:ln>
+          </p:spPr>
+          <p:txBody>
+            <a:bodyPr wrap="square" lIns="91425" tIns="45700" rIns="91425" bIns="45700" anchor="t" anchorCtr="0">
+              <a:noAutofit/>
+            </a:bodyPr>
+            <a:lstStyle/>
+            <a:p>
+              <a:pPr marL="0" marR="0" lvl="0" indent="0" algn="ctr" rtl="0">
+                <a:spcBef>
+                  <a:spcPts val="0"/>
+                </a:spcBef>
+                <a:buNone/>
+              </a:pPr>
+              <a:r>
+                <a:rPr lang="en" sz="1800" dirty="0" smtClean="0">
+                  <a:latin typeface="Calibri"/>
+                  <a:ea typeface="Calibri"/>
+                  <a:cs typeface="Calibri"/>
+                  <a:sym typeface="Calibri"/>
+                </a:rPr>
+                <a:t>Open-Dragone</a:t>
+              </a:r>
+              <a:endParaRPr lang="en" sz="1800" dirty="0">
                 <a:latin typeface="Calibri"/>
                 <a:ea typeface="Calibri"/>
                 <a:cs typeface="Calibri"/>
@@ -3438,146 +3827,194 @@
         </p:sp>
         <p:cxnSp>
           <p:nvCxnSpPr>
-            <p:cNvPr id="9" name="Shape 226"/>
+            <p:cNvPr id="22" name="Shape 220"/>
             <p:cNvCxnSpPr/>
             <p:nvPr/>
           </p:nvCxnSpPr>
           <p:spPr>
-            <a:xfrm flipH="1" flipV="1">
-              <a:off x="1714500" y="904875"/>
-              <a:ext cx="981076" cy="1781176"/>
+            <a:xfrm rot="11880000">
+              <a:off x="7807719" y="2535116"/>
+              <a:ext cx="0" cy="1214938"/>
             </a:xfrm>
             <a:prstGeom prst="straightConnector1">
               <a:avLst/>
             </a:prstGeom>
             <a:noFill/>
-            <a:ln w="25400" cap="flat" cmpd="sng">
+            <a:ln w="19050" cap="flat" cmpd="sng">
               <a:solidFill>
-                <a:srgbClr val="00B050"/>
+                <a:schemeClr val="tx1">
+                  <a:lumMod val="50000"/>
+                  <a:lumOff val="50000"/>
+                </a:schemeClr>
               </a:solidFill>
               <a:prstDash val="solid"/>
               <a:round/>
               <a:headEnd type="none" w="med" len="med"/>
-              <a:tailEnd type="stealth" w="lg" len="lg"/>
+              <a:tailEnd type="none" w="med" len="med"/>
             </a:ln>
-            <a:effectLst>
-              <a:outerShdw blurRad="40000" dist="20000" dir="5400000" rotWithShape="0">
-                <a:srgbClr val="000000">
-                  <a:alpha val="37650"/>
-                </a:srgbClr>
-              </a:outerShdw>
-            </a:effectLst>
+            <a:effectLst/>
           </p:spPr>
         </p:cxnSp>
         <p:cxnSp>
           <p:nvCxnSpPr>
-            <p:cNvPr id="10" name="Shape 227"/>
+            <p:cNvPr id="23" name="Shape 220"/>
             <p:cNvCxnSpPr/>
             <p:nvPr/>
           </p:nvCxnSpPr>
           <p:spPr>
-            <a:xfrm flipH="1">
-              <a:off x="3273426" y="2898775"/>
-              <a:ext cx="1168399" cy="3175"/>
+            <a:xfrm rot="13800000">
+              <a:off x="4615199" y="3173009"/>
+              <a:ext cx="0" cy="685801"/>
             </a:xfrm>
             <a:prstGeom prst="straightConnector1">
               <a:avLst/>
             </a:prstGeom>
             <a:noFill/>
-            <a:ln w="25400" cap="flat" cmpd="sng">
+            <a:ln w="19050" cap="flat" cmpd="sng">
               <a:solidFill>
-                <a:srgbClr val="00B050"/>
+                <a:schemeClr val="tx1">
+                  <a:lumMod val="50000"/>
+                  <a:lumOff val="50000"/>
+                </a:schemeClr>
               </a:solidFill>
               <a:prstDash val="solid"/>
               <a:round/>
               <a:headEnd type="none" w="med" len="med"/>
-              <a:tailEnd type="stealth" w="lg" len="lg"/>
+              <a:tailEnd type="none" w="med" len="med"/>
             </a:ln>
-            <a:effectLst>
-              <a:outerShdw blurRad="40000" dist="20000" dir="5400000" rotWithShape="0">
-                <a:srgbClr val="000000">
-                  <a:alpha val="37650"/>
-                </a:srgbClr>
-              </a:outerShdw>
-            </a:effectLst>
+            <a:effectLst/>
           </p:spPr>
         </p:cxnSp>
         <p:cxnSp>
           <p:nvCxnSpPr>
-            <p:cNvPr id="11" name="Shape 228"/>
+            <p:cNvPr id="24" name="Shape 220"/>
             <p:cNvCxnSpPr/>
             <p:nvPr/>
           </p:nvCxnSpPr>
           <p:spPr>
-            <a:xfrm flipV="1">
-              <a:off x="4140200" y="2978150"/>
-              <a:ext cx="422275" cy="487778"/>
+            <a:xfrm rot="19200000">
+              <a:off x="2735013" y="2704357"/>
+              <a:ext cx="0" cy="685801"/>
             </a:xfrm>
             <a:prstGeom prst="straightConnector1">
               <a:avLst/>
             </a:prstGeom>
             <a:noFill/>
-            <a:ln w="25400" cap="flat" cmpd="sng">
+            <a:ln w="19050" cap="flat" cmpd="sng">
               <a:solidFill>
-                <a:srgbClr val="00B050"/>
+                <a:schemeClr val="tx1">
+                  <a:lumMod val="50000"/>
+                  <a:lumOff val="50000"/>
+                </a:schemeClr>
               </a:solidFill>
               <a:prstDash val="solid"/>
               <a:round/>
               <a:headEnd type="none" w="med" len="med"/>
-              <a:tailEnd type="stealth" w="lg" len="lg"/>
+              <a:tailEnd type="none" w="med" len="med"/>
             </a:ln>
-            <a:effectLst>
-              <a:outerShdw blurRad="40000" dist="20000" dir="5400000" rotWithShape="0">
-                <a:srgbClr val="000000">
-                  <a:alpha val="37650"/>
-                </a:srgbClr>
-              </a:outerShdw>
-            </a:effectLst>
+            <a:effectLst/>
           </p:spPr>
         </p:cxnSp>
         <p:cxnSp>
           <p:nvCxnSpPr>
-            <p:cNvPr id="12" name="Shape 229"/>
+            <p:cNvPr id="25" name="Shape 220"/>
             <p:cNvCxnSpPr/>
             <p:nvPr/>
           </p:nvCxnSpPr>
           <p:spPr>
-            <a:xfrm>
-              <a:off x="3657600" y="1552575"/>
-              <a:ext cx="393700" cy="1758950"/>
+            <a:xfrm rot="17220000">
+              <a:off x="3654522" y="2787668"/>
+              <a:ext cx="0" cy="1470075"/>
             </a:xfrm>
             <a:prstGeom prst="straightConnector1">
               <a:avLst/>
             </a:prstGeom>
             <a:noFill/>
-            <a:ln w="25400" cap="flat" cmpd="sng">
+            <a:ln w="19050" cap="flat" cmpd="sng">
               <a:solidFill>
-                <a:srgbClr val="00B050"/>
+                <a:schemeClr val="tx1">
+                  <a:lumMod val="50000"/>
+                  <a:lumOff val="50000"/>
+                </a:schemeClr>
               </a:solidFill>
               <a:prstDash val="solid"/>
               <a:round/>
               <a:headEnd type="none" w="med" len="med"/>
-              <a:tailEnd type="stealth" w="lg" len="lg"/>
+              <a:tailEnd type="none" w="med" len="med"/>
             </a:ln>
-            <a:effectLst>
-              <a:outerShdw blurRad="40000" dist="20000" dir="5400000" rotWithShape="0">
-                <a:srgbClr val="000000">
-                  <a:alpha val="37650"/>
-                </a:srgbClr>
-              </a:outerShdw>
-            </a:effectLst>
+            <a:effectLst/>
+          </p:spPr>
+        </p:cxnSp>
+        <p:cxnSp>
+          <p:nvCxnSpPr>
+            <p:cNvPr id="26" name="Shape 220"/>
+            <p:cNvCxnSpPr/>
+            <p:nvPr/>
+          </p:nvCxnSpPr>
+          <p:spPr>
+            <a:xfrm rot="15600000">
+              <a:off x="6738051" y="3628503"/>
+              <a:ext cx="0" cy="1004081"/>
+            </a:xfrm>
+            <a:prstGeom prst="straightConnector1">
+              <a:avLst/>
+            </a:prstGeom>
+            <a:noFill/>
+            <a:ln w="19050" cap="flat" cmpd="sng">
+              <a:solidFill>
+                <a:schemeClr val="tx1">
+                  <a:lumMod val="50000"/>
+                  <a:lumOff val="50000"/>
+                </a:schemeClr>
+              </a:solidFill>
+              <a:prstDash val="solid"/>
+              <a:round/>
+              <a:headEnd type="none" w="med" len="med"/>
+              <a:tailEnd type="none" w="med" len="med"/>
+            </a:ln>
+            <a:effectLst/>
+          </p:spPr>
+        </p:cxnSp>
+        <p:cxnSp>
+          <p:nvCxnSpPr>
+            <p:cNvPr id="27" name="Shape 220"/>
+            <p:cNvCxnSpPr/>
+            <p:nvPr/>
+          </p:nvCxnSpPr>
+          <p:spPr>
+            <a:xfrm rot="13800000">
+              <a:off x="7422647" y="3622723"/>
+              <a:ext cx="0" cy="515252"/>
+            </a:xfrm>
+            <a:prstGeom prst="straightConnector1">
+              <a:avLst/>
+            </a:prstGeom>
+            <a:noFill/>
+            <a:ln w="19050" cap="flat" cmpd="sng">
+              <a:solidFill>
+                <a:schemeClr val="tx1">
+                  <a:lumMod val="50000"/>
+                  <a:lumOff val="50000"/>
+                </a:schemeClr>
+              </a:solidFill>
+              <a:prstDash val="solid"/>
+              <a:round/>
+              <a:headEnd type="none" w="med" len="med"/>
+              <a:tailEnd type="none" w="med" len="med"/>
+            </a:ln>
+            <a:effectLst/>
           </p:spPr>
         </p:cxnSp>
         <p:sp>
           <p:nvSpPr>
-            <p:cNvPr id="13" name="Shape 230"/>
+            <p:cNvPr id="28" name="Shape 221"/>
             <p:cNvSpPr txBox="1"/>
             <p:nvPr/>
           </p:nvSpPr>
           <p:spPr>
             <a:xfrm>
-              <a:off x="1068000" y="2830350"/>
-              <a:ext cx="1294200" cy="427200"/>
+              <a:off x="2957758" y="3486150"/>
+              <a:ext cx="1538042" cy="324942"/>
             </a:xfrm>
             <a:prstGeom prst="rect">
               <a:avLst/>
@@ -3600,115 +4037,93 @@
                 <a:buNone/>
               </a:pPr>
               <a:r>
-                <a:rPr lang="en" sz="1800" dirty="0">
+                <a:rPr lang="en" sz="1400" dirty="0" smtClean="0">
                   <a:solidFill>
-                    <a:srgbClr val="538CD5"/>
+                    <a:schemeClr val="tx1">
+                      <a:lumMod val="50000"/>
+                      <a:lumOff val="50000"/>
+                    </a:schemeClr>
                   </a:solidFill>
                   <a:latin typeface="Calibri"/>
                   <a:ea typeface="Calibri"/>
                   <a:cs typeface="Calibri"/>
                   <a:sym typeface="Calibri"/>
                 </a:rPr>
-                <a:t>Direct view </a:t>
+                <a:t>Baffles</a:t>
               </a:r>
+              <a:endParaRPr lang="en" sz="1400" dirty="0">
+                <a:solidFill>
+                  <a:schemeClr val="tx1">
+                    <a:lumMod val="50000"/>
+                    <a:lumOff val="50000"/>
+                  </a:schemeClr>
+                </a:solidFill>
+                <a:latin typeface="Calibri"/>
+                <a:ea typeface="Calibri"/>
+                <a:cs typeface="Calibri"/>
+                <a:sym typeface="Calibri"/>
+              </a:endParaRPr>
+            </a:p>
+          </p:txBody>
+        </p:sp>
+        <p:sp>
+          <p:nvSpPr>
+            <p:cNvPr id="29" name="Shape 221"/>
+            <p:cNvSpPr txBox="1"/>
+            <p:nvPr/>
+          </p:nvSpPr>
+          <p:spPr>
+            <a:xfrm>
+              <a:off x="7605958" y="3770808"/>
+              <a:ext cx="1538042" cy="324942"/>
+            </a:xfrm>
+            <a:prstGeom prst="rect">
+              <a:avLst/>
+            </a:prstGeom>
+            <a:noFill/>
+            <a:ln>
+              <a:noFill/>
+            </a:ln>
+          </p:spPr>
+          <p:txBody>
+            <a:bodyPr wrap="square" lIns="91425" tIns="45700" rIns="91425" bIns="45700" anchor="t" anchorCtr="0">
+              <a:noAutofit/>
+            </a:bodyPr>
+            <a:lstStyle/>
+            <a:p>
+              <a:pPr marL="0" marR="0" lvl="0" indent="0" algn="l" rtl="0">
+                <a:spcBef>
+                  <a:spcPts val="0"/>
+                </a:spcBef>
+                <a:buNone/>
+              </a:pPr>
               <a:r>
-                <a:rPr lang="en" sz="1800" dirty="0" smtClean="0">
+                <a:rPr lang="en" sz="1400" dirty="0" smtClean="0">
                   <a:solidFill>
-                    <a:srgbClr val="538CD5"/>
+                    <a:schemeClr val="tx1">
+                      <a:lumMod val="50000"/>
+                      <a:lumOff val="50000"/>
+                    </a:schemeClr>
                   </a:solidFill>
                   <a:latin typeface="Calibri"/>
                   <a:ea typeface="Calibri"/>
                   <a:cs typeface="Calibri"/>
                   <a:sym typeface="Calibri"/>
                 </a:rPr>
-                <a:t>to </a:t>
+                <a:t>Baffles</a:t>
               </a:r>
-              <a:r>
-                <a:rPr lang="en" sz="1800" dirty="0">
-                  <a:solidFill>
-                    <a:srgbClr val="538CD5"/>
-                  </a:solidFill>
-                  <a:latin typeface="Calibri"/>
-                  <a:ea typeface="Calibri"/>
-                  <a:cs typeface="Calibri"/>
-                  <a:sym typeface="Calibri"/>
-                </a:rPr>
-                <a:t>sky</a:t>
-              </a:r>
-            </a:p>
-          </p:txBody>
-        </p:sp>
-        <p:cxnSp>
-          <p:nvCxnSpPr>
-            <p:cNvPr id="14" name="Shape 231"/>
-            <p:cNvCxnSpPr/>
-            <p:nvPr/>
-          </p:nvCxnSpPr>
-          <p:spPr>
-            <a:xfrm rot="5400000">
-              <a:off x="1859475" y="1219758"/>
-              <a:ext cx="1814700" cy="1524300"/>
-            </a:xfrm>
-            <a:prstGeom prst="straightConnector1">
-              <a:avLst/>
-            </a:prstGeom>
-            <a:noFill/>
-            <a:ln w="9525" cap="flat" cmpd="sng">
-              <a:solidFill>
-                <a:srgbClr val="4A7DBA"/>
-              </a:solidFill>
-              <a:prstDash val="solid"/>
-              <a:round/>
-              <a:headEnd type="none" w="med" len="med"/>
-              <a:tailEnd type="stealth" w="lg" len="lg"/>
-            </a:ln>
-          </p:spPr>
-        </p:cxnSp>
-        <p:sp>
-          <p:nvSpPr>
-            <p:cNvPr id="17" name="Rectangle 16"/>
-            <p:cNvSpPr/>
-            <p:nvPr/>
-          </p:nvSpPr>
-          <p:spPr>
-            <a:xfrm>
-              <a:off x="2073851" y="1383030"/>
-              <a:ext cx="123567" cy="76200"/>
-            </a:xfrm>
-            <a:prstGeom prst="rect">
-              <a:avLst/>
-            </a:prstGeom>
-            <a:solidFill>
-              <a:schemeClr val="bg1"/>
-            </a:solidFill>
-            <a:ln>
-              <a:solidFill>
-                <a:schemeClr val="bg1"/>
-              </a:solidFill>
-            </a:ln>
-          </p:spPr>
-          <p:style>
-            <a:lnRef idx="2">
-              <a:schemeClr val="accent1">
-                <a:shade val="50000"/>
-              </a:schemeClr>
-            </a:lnRef>
-            <a:fillRef idx="1">
-              <a:schemeClr val="accent1"/>
-            </a:fillRef>
-            <a:effectRef idx="0">
-              <a:schemeClr val="accent1"/>
-            </a:effectRef>
-            <a:fontRef idx="minor">
-              <a:schemeClr val="lt1"/>
-            </a:fontRef>
-          </p:style>
-          <p:txBody>
-            <a:bodyPr rtlCol="0" anchor="ctr"/>
-            <a:lstStyle/>
-            <a:p>
-              <a:pPr algn="ctr"/>
-              <a:endParaRPr lang="en-US"/>
+              <a:endParaRPr lang="en" sz="1400" dirty="0">
+                <a:solidFill>
+                  <a:schemeClr val="tx1">
+                    <a:lumMod val="50000"/>
+                    <a:lumOff val="50000"/>
+                  </a:schemeClr>
+                </a:solidFill>
+                <a:latin typeface="Calibri"/>
+                <a:ea typeface="Calibri"/>
+                <a:cs typeface="Calibri"/>
+                <a:sym typeface="Calibri"/>
+              </a:endParaRPr>
             </a:p>
           </p:txBody>
         </p:sp>

</xml_diff>